<commit_message>
adelanto de diapositivas cici
</commit_message>
<xml_diff>
--- a/CICI/Presentación Ponencias orales CICI 2025.pptx
+++ b/CICI/Presentación Ponencias orales CICI 2025.pptx
@@ -9,12 +9,12 @@
   </p:notesMasterIdLst>
   <p:sldIdLst>
     <p:sldId id="256" r:id="rId2"/>
-    <p:sldId id="257" r:id="rId3"/>
-    <p:sldId id="258" r:id="rId4"/>
+    <p:sldId id="258" r:id="rId3"/>
+    <p:sldId id="267" r:id="rId4"/>
     <p:sldId id="259" r:id="rId5"/>
     <p:sldId id="260" r:id="rId6"/>
-    <p:sldId id="261" r:id="rId7"/>
-    <p:sldId id="262" r:id="rId8"/>
+    <p:sldId id="262" r:id="rId7"/>
+    <p:sldId id="261" r:id="rId8"/>
     <p:sldId id="263" r:id="rId9"/>
     <p:sldId id="264" r:id="rId10"/>
   </p:sldIdLst>
@@ -250,8 +250,11 @@
     </a:lvl9pPr>
   </p:defaultTextStyle>
   <p:extLst>
+    <p:ext uri="{EFAFB233-063F-42B5-8137-9DF3F51BA10A}">
+      <p15:sldGuideLst xmlns:p15="http://schemas.microsoft.com/office/powerpoint/2012/main"/>
+    </p:ext>
     <p:ext uri="GoogleSlidesCustomDataVersion2">
-      <go:slidesCustomData xmlns:go="http://customooxmlschemas.google.com/" xmlns:ahyp="http://schemas.microsoft.com/office/drawing/2018/hyperlinkcolor" xmlns:p15="http://schemas.microsoft.com/office/powerpoint/2012/main" xmlns:p14="http://schemas.microsoft.com/office/powerpoint/2010/main" xmlns:com="http://schemas.openxmlformats.org/drawingml/2006/compatibility" xmlns:pvml="urn:schemas-microsoft-com:office:powerpoint" xmlns:v="urn:schemas-microsoft-com:vml" xmlns:o="urn:schemas-microsoft-com:office:office" xmlns:dgm="http://schemas.openxmlformats.org/drawingml/2006/diagram" xmlns:c="http://schemas.openxmlformats.org/drawingml/2006/chart" xmlns:mv="urn:schemas-microsoft-com:mac:vml" xmlns:mc="http://schemas.openxmlformats.org/markup-compatibility/2006" xmlns="" r:id="rId14" roundtripDataSignature="AMtx7mgkIIJeai/5RzcJrk9XhuQE/n09+A=="/>
+      <go:slidesCustomData xmlns="" xmlns:mc="http://schemas.openxmlformats.org/markup-compatibility/2006" xmlns:mv="urn:schemas-microsoft-com:mac:vml" xmlns:c="http://schemas.openxmlformats.org/drawingml/2006/chart" xmlns:dgm="http://schemas.openxmlformats.org/drawingml/2006/diagram" xmlns:o="urn:schemas-microsoft-com:office:office" xmlns:v="urn:schemas-microsoft-com:vml" xmlns:pvml="urn:schemas-microsoft-com:office:powerpoint" xmlns:com="http://schemas.openxmlformats.org/drawingml/2006/compatibility" xmlns:p14="http://schemas.microsoft.com/office/powerpoint/2010/main" xmlns:p15="http://schemas.microsoft.com/office/powerpoint/2012/main" xmlns:ahyp="http://schemas.microsoft.com/office/drawing/2018/hyperlinkcolor" xmlns:go="http://customooxmlschemas.google.com/" r:id="rId14" roundtripDataSignature="AMtx7mgkIIJeai/5RzcJrk9XhuQE/n09+A=="/>
     </p:ext>
   </p:extLst>
 </p:presentation>
@@ -807,7 +810,7 @@
   <p:cSld>
     <p:spTree>
       <p:nvGrpSpPr>
-        <p:cNvPr id="1" name="Shape 86"/>
+        <p:cNvPr id="1" name="Shape 92"/>
         <p:cNvGrpSpPr/>
         <p:nvPr/>
       </p:nvGrpSpPr>
@@ -821,7 +824,7 @@
       </p:grpSpPr>
       <p:sp>
         <p:nvSpPr>
-          <p:cNvPr id="87" name="Google Shape;87;p2:notes"/>
+          <p:cNvPr id="93" name="Google Shape;93;p3:notes"/>
           <p:cNvSpPr txBox="1">
             <a:spLocks noGrp="1"/>
           </p:cNvSpPr>
@@ -859,7 +862,7 @@
       </p:sp>
       <p:sp>
         <p:nvSpPr>
-          <p:cNvPr id="88" name="Google Shape;88;p2:notes"/>
+          <p:cNvPr id="94" name="Google Shape;94;p3:notes"/>
           <p:cNvSpPr>
             <a:spLocks noGrp="1" noRot="1" noChangeAspect="1"/>
           </p:cNvSpPr>
@@ -1003,6 +1006,11 @@
         </p:spPr>
       </p:sp>
     </p:spTree>
+    <p:extLst>
+      <p:ext uri="{BB962C8B-B14F-4D97-AF65-F5344CB8AC3E}">
+        <p14:creationId xmlns:p14="http://schemas.microsoft.com/office/powerpoint/2010/main" val="1752544375"/>
+      </p:ext>
+    </p:extLst>
   </p:cSld>
   <p:clrMapOvr>
     <a:masterClrMapping/>
@@ -1181,8 +1189,8 @@
         </p:nvSpPr>
         <p:spPr>
           <a:xfrm>
-            <a:off x="1143225" y="685800"/>
-            <a:ext cx="4572225" cy="3429000"/>
+            <a:off x="381000" y="685800"/>
+            <a:ext cx="6096000" cy="3429000"/>
           </a:xfrm>
           <a:custGeom>
             <a:avLst/>
@@ -1219,6 +1227,110 @@
 </file>
 
 <file path=ppt/notesSlides/notesSlide6.xml><?xml version="1.0" encoding="utf-8"?>
+<p:notes xmlns:a="http://schemas.openxmlformats.org/drawingml/2006/main" xmlns:r="http://schemas.openxmlformats.org/officeDocument/2006/relationships" xmlns:p="http://schemas.openxmlformats.org/presentationml/2006/main" showMasterSp="0" showMasterPhAnim="0">
+  <p:cSld>
+    <p:spTree>
+      <p:nvGrpSpPr>
+        <p:cNvPr id="1" name="Shape 116"/>
+        <p:cNvGrpSpPr/>
+        <p:nvPr/>
+      </p:nvGrpSpPr>
+      <p:grpSpPr>
+        <a:xfrm>
+          <a:off x="0" y="0"/>
+          <a:ext cx="0" cy="0"/>
+          <a:chOff x="0" y="0"/>
+          <a:chExt cx="0" cy="0"/>
+        </a:xfrm>
+      </p:grpSpPr>
+      <p:sp>
+        <p:nvSpPr>
+          <p:cNvPr id="117" name="Google Shape;117;p7:notes"/>
+          <p:cNvSpPr txBox="1">
+            <a:spLocks noGrp="1"/>
+          </p:cNvSpPr>
+          <p:nvPr>
+            <p:ph type="body" idx="1"/>
+          </p:nvPr>
+        </p:nvSpPr>
+        <p:spPr>
+          <a:xfrm>
+            <a:off x="685800" y="4343400"/>
+            <a:ext cx="5486400" cy="4114800"/>
+          </a:xfrm>
+          <a:prstGeom prst="rect">
+            <a:avLst/>
+          </a:prstGeom>
+        </p:spPr>
+        <p:txBody>
+          <a:bodyPr spcFirstLastPara="1" wrap="square" lIns="91425" tIns="91425" rIns="91425" bIns="91425" anchor="t" anchorCtr="0">
+            <a:noAutofit/>
+          </a:bodyPr>
+          <a:lstStyle/>
+          <a:p>
+            <a:pPr marL="0" lvl="0" indent="0" algn="l" rtl="0">
+              <a:spcBef>
+                <a:spcPts val="0"/>
+              </a:spcBef>
+              <a:spcAft>
+                <a:spcPts val="0"/>
+              </a:spcAft>
+              <a:buNone/>
+            </a:pPr>
+            <a:endParaRPr/>
+          </a:p>
+        </p:txBody>
+      </p:sp>
+      <p:sp>
+        <p:nvSpPr>
+          <p:cNvPr id="118" name="Google Shape;118;p7:notes"/>
+          <p:cNvSpPr>
+            <a:spLocks noGrp="1" noRot="1" noChangeAspect="1"/>
+          </p:cNvSpPr>
+          <p:nvPr>
+            <p:ph type="sldImg" idx="2"/>
+          </p:nvPr>
+        </p:nvSpPr>
+        <p:spPr>
+          <a:xfrm>
+            <a:off x="381000" y="685800"/>
+            <a:ext cx="6096000" cy="3429000"/>
+          </a:xfrm>
+          <a:custGeom>
+            <a:avLst/>
+            <a:gdLst/>
+            <a:ahLst/>
+            <a:cxnLst/>
+            <a:rect l="l" t="t" r="r" b="b"/>
+            <a:pathLst>
+              <a:path w="120000" h="120000" extrusionOk="0">
+                <a:moveTo>
+                  <a:pt x="0" y="0"/>
+                </a:moveTo>
+                <a:lnTo>
+                  <a:pt x="120000" y="0"/>
+                </a:lnTo>
+                <a:lnTo>
+                  <a:pt x="120000" y="120000"/>
+                </a:lnTo>
+                <a:lnTo>
+                  <a:pt x="0" y="120000"/>
+                </a:lnTo>
+                <a:close/>
+              </a:path>
+            </a:pathLst>
+          </a:custGeom>
+        </p:spPr>
+      </p:sp>
+    </p:spTree>
+  </p:cSld>
+  <p:clrMapOvr>
+    <a:masterClrMapping/>
+  </p:clrMapOvr>
+</p:notes>
+</file>
+
+<file path=ppt/notesSlides/notesSlide7.xml><?xml version="1.0" encoding="utf-8"?>
 <p:notes xmlns:a="http://schemas.openxmlformats.org/drawingml/2006/main" xmlns:r="http://schemas.openxmlformats.org/officeDocument/2006/relationships" xmlns:p="http://schemas.openxmlformats.org/presentationml/2006/main" showMasterSp="0" showMasterPhAnim="0">
   <p:cSld>
     <p:spTree>
@@ -1285,112 +1397,8 @@
         </p:nvSpPr>
         <p:spPr>
           <a:xfrm>
-            <a:off x="1143225" y="685800"/>
-            <a:ext cx="4572225" cy="3429000"/>
-          </a:xfrm>
-          <a:custGeom>
-            <a:avLst/>
-            <a:gdLst/>
-            <a:ahLst/>
-            <a:cxnLst/>
-            <a:rect l="l" t="t" r="r" b="b"/>
-            <a:pathLst>
-              <a:path w="120000" h="120000" extrusionOk="0">
-                <a:moveTo>
-                  <a:pt x="0" y="0"/>
-                </a:moveTo>
-                <a:lnTo>
-                  <a:pt x="120000" y="0"/>
-                </a:lnTo>
-                <a:lnTo>
-                  <a:pt x="120000" y="120000"/>
-                </a:lnTo>
-                <a:lnTo>
-                  <a:pt x="0" y="120000"/>
-                </a:lnTo>
-                <a:close/>
-              </a:path>
-            </a:pathLst>
-          </a:custGeom>
-        </p:spPr>
-      </p:sp>
-    </p:spTree>
-  </p:cSld>
-  <p:clrMapOvr>
-    <a:masterClrMapping/>
-  </p:clrMapOvr>
-</p:notes>
-</file>
-
-<file path=ppt/notesSlides/notesSlide7.xml><?xml version="1.0" encoding="utf-8"?>
-<p:notes xmlns:a="http://schemas.openxmlformats.org/drawingml/2006/main" xmlns:r="http://schemas.openxmlformats.org/officeDocument/2006/relationships" xmlns:p="http://schemas.openxmlformats.org/presentationml/2006/main" showMasterSp="0" showMasterPhAnim="0">
-  <p:cSld>
-    <p:spTree>
-      <p:nvGrpSpPr>
-        <p:cNvPr id="1" name="Shape 116"/>
-        <p:cNvGrpSpPr/>
-        <p:nvPr/>
-      </p:nvGrpSpPr>
-      <p:grpSpPr>
-        <a:xfrm>
-          <a:off x="0" y="0"/>
-          <a:ext cx="0" cy="0"/>
-          <a:chOff x="0" y="0"/>
-          <a:chExt cx="0" cy="0"/>
-        </a:xfrm>
-      </p:grpSpPr>
-      <p:sp>
-        <p:nvSpPr>
-          <p:cNvPr id="117" name="Google Shape;117;p7:notes"/>
-          <p:cNvSpPr txBox="1">
-            <a:spLocks noGrp="1"/>
-          </p:cNvSpPr>
-          <p:nvPr>
-            <p:ph type="body" idx="1"/>
-          </p:nvPr>
-        </p:nvSpPr>
-        <p:spPr>
-          <a:xfrm>
-            <a:off x="685800" y="4343400"/>
-            <a:ext cx="5486400" cy="4114800"/>
-          </a:xfrm>
-          <a:prstGeom prst="rect">
-            <a:avLst/>
-          </a:prstGeom>
-        </p:spPr>
-        <p:txBody>
-          <a:bodyPr spcFirstLastPara="1" wrap="square" lIns="91425" tIns="91425" rIns="91425" bIns="91425" anchor="t" anchorCtr="0">
-            <a:noAutofit/>
-          </a:bodyPr>
-          <a:lstStyle/>
-          <a:p>
-            <a:pPr marL="0" lvl="0" indent="0" algn="l" rtl="0">
-              <a:spcBef>
-                <a:spcPts val="0"/>
-              </a:spcBef>
-              <a:spcAft>
-                <a:spcPts val="0"/>
-              </a:spcAft>
-              <a:buNone/>
-            </a:pPr>
-            <a:endParaRPr/>
-          </a:p>
-        </p:txBody>
-      </p:sp>
-      <p:sp>
-        <p:nvSpPr>
-          <p:cNvPr id="118" name="Google Shape;118;p7:notes"/>
-          <p:cNvSpPr>
-            <a:spLocks noGrp="1" noRot="1" noChangeAspect="1"/>
-          </p:cNvSpPr>
-          <p:nvPr>
-            <p:ph type="sldImg" idx="2"/>
-          </p:nvPr>
-        </p:nvSpPr>
-        <p:spPr>
-          <a:xfrm>
-            <a:off x="1143225" y="685800"/>
-            <a:ext cx="4572225" cy="3429000"/>
+            <a:off x="381000" y="685800"/>
+            <a:ext cx="6096000" cy="3429000"/>
           </a:xfrm>
           <a:custGeom>
             <a:avLst/>
@@ -1493,8 +1501,8 @@
         </p:nvSpPr>
         <p:spPr>
           <a:xfrm>
-            <a:off x="1143225" y="685800"/>
-            <a:ext cx="4572225" cy="3429000"/>
+            <a:off x="381000" y="685800"/>
+            <a:ext cx="6096000" cy="3429000"/>
           </a:xfrm>
           <a:custGeom>
             <a:avLst/>
@@ -12004,9 +12012,22 @@
 <file path=ppt/slides/slide2.xml><?xml version="1.0" encoding="utf-8"?>
 <p:sld xmlns:a="http://schemas.openxmlformats.org/drawingml/2006/main" xmlns:r="http://schemas.openxmlformats.org/officeDocument/2006/relationships" xmlns:p="http://schemas.openxmlformats.org/presentationml/2006/main">
   <p:cSld>
+    <p:bg>
+      <p:bgPr>
+        <a:blipFill>
+          <a:blip r:embed="rId3">
+            <a:alphaModFix/>
+          </a:blip>
+          <a:stretch>
+            <a:fillRect/>
+          </a:stretch>
+        </a:blipFill>
+        <a:effectLst/>
+      </p:bgPr>
+    </p:bg>
     <p:spTree>
       <p:nvGrpSpPr>
-        <p:cNvPr id="1" name="Shape 89"/>
+        <p:cNvPr id="1" name="Shape 95"/>
         <p:cNvGrpSpPr/>
         <p:nvPr/>
       </p:nvGrpSpPr>
@@ -12020,7 +12041,7 @@
       </p:grpSpPr>
       <p:sp>
         <p:nvSpPr>
-          <p:cNvPr id="90" name="Google Shape;90;p2"/>
+          <p:cNvPr id="96" name="Google Shape;96;p3"/>
           <p:cNvSpPr txBox="1">
             <a:spLocks noGrp="1"/>
           </p:cNvSpPr>
@@ -12065,16 +12086,22 @@
               <a:buNone/>
             </a:pPr>
             <a:r>
-              <a:rPr lang="en-US" b="1" dirty="0">
+              <a:rPr lang="es-MX" b="1" dirty="0">
                 <a:solidFill>
-                  <a:schemeClr val="accent5"/>
+                  <a:schemeClr val="accent2">
+                    <a:lumMod val="60000"/>
+                    <a:lumOff val="40000"/>
+                  </a:schemeClr>
                 </a:solidFill>
               </a:rPr>
-              <a:t>INTRODUCCION</a:t>
+              <a:t>INTRODUCCIÓN  </a:t>
             </a:r>
             <a:endParaRPr b="1" dirty="0">
               <a:solidFill>
-                <a:schemeClr val="accent5"/>
+                <a:schemeClr val="accent2">
+                  <a:lumMod val="60000"/>
+                  <a:lumOff val="40000"/>
+                </a:schemeClr>
               </a:solidFill>
             </a:endParaRPr>
           </a:p>
@@ -12082,7 +12109,7 @@
       </p:sp>
       <p:sp>
         <p:nvSpPr>
-          <p:cNvPr id="91" name="Google Shape;91;p2"/>
+          <p:cNvPr id="97" name="Google Shape;97;p3"/>
           <p:cNvSpPr txBox="1">
             <a:spLocks noGrp="1"/>
           </p:cNvSpPr>
@@ -12092,8 +12119,8 @@
         </p:nvSpPr>
         <p:spPr>
           <a:xfrm>
-            <a:off x="838200" y="1825625"/>
-            <a:ext cx="10515600" cy="4351338"/>
+            <a:off x="6506308" y="1825625"/>
+            <a:ext cx="4847492" cy="4351338"/>
           </a:xfrm>
           <a:prstGeom prst="rect">
             <a:avLst/>
@@ -12109,6 +12136,32 @@
           </a:bodyPr>
           <a:lstStyle/>
           <a:p>
+            <a:pPr marL="228600" indent="-50800" algn="just">
+              <a:spcBef>
+                <a:spcPts val="0"/>
+              </a:spcBef>
+              <a:buSzPts val="2800"/>
+              <a:buNone/>
+            </a:pPr>
+            <a:r>
+              <a:rPr lang="es-CO" sz="2600" dirty="0">
+                <a:solidFill>
+                  <a:srgbClr val="000000"/>
+                </a:solidFill>
+                <a:effectLst/>
+                <a:latin typeface="Garamond" panose="02020404030301010803" pitchFamily="18" charset="0"/>
+                <a:ea typeface="Garamond" panose="02020404030301010803" pitchFamily="18" charset="0"/>
+                <a:cs typeface="Garamond" panose="02020404030301010803" pitchFamily="18" charset="0"/>
+              </a:rPr>
+              <a:t>Los contaminantes presentes en el aire afectan negativamente la salud y el medio ambiente. En Colombia, las actividades antrópicas contribuyen a la emisión tanto de gases de efecto invernadero como de contaminantes; Este panorama no es indiferente en la ciudad de Pasto, particularmente en la Universidad Mariana.</a:t>
+            </a:r>
+            <a:endParaRPr lang="es-CO" sz="2600" dirty="0">
+              <a:effectLst/>
+              <a:latin typeface="Calibri" panose="020F0502020204030204" pitchFamily="34" charset="0"/>
+              <a:ea typeface="Calibri" panose="020F0502020204030204" pitchFamily="34" charset="0"/>
+            </a:endParaRPr>
+          </a:p>
+          <a:p>
             <a:pPr marL="228600" lvl="0" indent="-50800" algn="l" rtl="0">
               <a:lnSpc>
                 <a:spcPct val="90000"/>
@@ -12129,6 +12182,36 @@
           </a:p>
         </p:txBody>
       </p:sp>
+      <p:pic>
+        <p:nvPicPr>
+          <p:cNvPr id="2" name="Imagen 1">
+            <a:extLst>
+              <a:ext uri="{FF2B5EF4-FFF2-40B4-BE49-F238E27FC236}">
+                <a16:creationId xmlns:a16="http://schemas.microsoft.com/office/drawing/2014/main" id="{C2507D7B-A64F-40CC-857D-AE4BD03BF76C}"/>
+              </a:ext>
+            </a:extLst>
+          </p:cNvPr>
+          <p:cNvPicPr>
+            <a:picLocks noChangeAspect="1"/>
+          </p:cNvPicPr>
+          <p:nvPr/>
+        </p:nvPicPr>
+        <p:blipFill>
+          <a:blip r:embed="rId4"/>
+          <a:stretch>
+            <a:fillRect/>
+          </a:stretch>
+        </p:blipFill>
+        <p:spPr>
+          <a:xfrm>
+            <a:off x="574853" y="2111370"/>
+            <a:ext cx="3779848" cy="3779848"/>
+          </a:xfrm>
+          <a:prstGeom prst="rect">
+            <a:avLst/>
+          </a:prstGeom>
+        </p:spPr>
+      </p:pic>
     </p:spTree>
   </p:cSld>
   <p:clrMapOvr>
@@ -12196,7 +12279,7 @@
           </a:bodyPr>
           <a:lstStyle/>
           <a:p>
-            <a:pPr marL="0" lvl="0" indent="0" algn="l" rtl="0">
+            <a:pPr marL="0" lvl="0" indent="0" algn="r" rtl="0">
               <a:lnSpc>
                 <a:spcPct val="90000"/>
               </a:lnSpc>
@@ -12214,18 +12297,16 @@
               <a:buNone/>
             </a:pPr>
             <a:r>
-              <a:rPr lang="en-US" b="1" dirty="0">
+              <a:rPr lang="es-MX" b="1" dirty="0">
                 <a:solidFill>
-                  <a:schemeClr val="bg1"/>
+                  <a:schemeClr val="accent2">
+                    <a:lumMod val="60000"/>
+                    <a:lumOff val="40000"/>
+                  </a:schemeClr>
                 </a:solidFill>
               </a:rPr>
-              <a:t>METODOLOGIA</a:t>
+              <a:t>INTRODUCCIÓN </a:t>
             </a:r>
-            <a:endParaRPr b="1" dirty="0">
-              <a:solidFill>
-                <a:schemeClr val="bg1"/>
-              </a:solidFill>
-            </a:endParaRPr>
           </a:p>
         </p:txBody>
       </p:sp>
@@ -12241,8 +12322,8 @@
         </p:nvSpPr>
         <p:spPr>
           <a:xfrm>
-            <a:off x="838200" y="1825625"/>
-            <a:ext cx="10515600" cy="4351338"/>
+            <a:off x="6515100" y="1825625"/>
+            <a:ext cx="4838700" cy="4351338"/>
           </a:xfrm>
           <a:prstGeom prst="rect">
             <a:avLst/>
@@ -12254,31 +12335,71 @@
         </p:spPr>
         <p:txBody>
           <a:bodyPr spcFirstLastPara="1" wrap="square" lIns="91425" tIns="45700" rIns="91425" bIns="45700" anchor="t" anchorCtr="0">
-            <a:normAutofit/>
+            <a:normAutofit fontScale="92500" lnSpcReduction="20000"/>
           </a:bodyPr>
           <a:lstStyle/>
           <a:p>
-            <a:pPr marL="228600" lvl="0" indent="-50800" algn="l" rtl="0">
-              <a:lnSpc>
-                <a:spcPct val="90000"/>
-              </a:lnSpc>
-              <a:spcBef>
-                <a:spcPts val="0"/>
-              </a:spcBef>
-              <a:spcAft>
-                <a:spcPts val="0"/>
-              </a:spcAft>
-              <a:buClr>
-                <a:schemeClr val="dk1"/>
-              </a:buClr>
-              <a:buSzPts val="2800"/>
+            <a:pPr marL="114300" indent="0" algn="just">
+              <a:lnSpc>
+                <a:spcPct val="107000"/>
+              </a:lnSpc>
+              <a:spcAft>
+                <a:spcPts val="800"/>
+              </a:spcAft>
               <a:buNone/>
             </a:pPr>
-            <a:endParaRPr dirty="0"/>
+            <a:r>
+              <a:rPr lang="es-CO" dirty="0">
+                <a:solidFill>
+                  <a:srgbClr val="000000"/>
+                </a:solidFill>
+                <a:effectLst/>
+                <a:latin typeface="Garamond" panose="02020404030301010803" pitchFamily="18" charset="0"/>
+                <a:ea typeface="Garamond" panose="02020404030301010803" pitchFamily="18" charset="0"/>
+                <a:cs typeface="Garamond" panose="02020404030301010803" pitchFamily="18" charset="0"/>
+              </a:rPr>
+              <a:t>Actualmente, la universidad carece de un sistema accesible de monitoreo de la calidad de aire, limitando la democratización de la información de la presencia de contaminantes en el aire y de sus efectos en la salud y el medio ambiente. Para suplir esta carencia, el presente proyecto se enfoca en desarrollar una plataforma web para medir material particulado.</a:t>
+            </a:r>
+            <a:endParaRPr lang="es-MX" sz="4000" dirty="0"/>
           </a:p>
         </p:txBody>
       </p:sp>
+      <p:pic>
+        <p:nvPicPr>
+          <p:cNvPr id="5" name="Imagen 4">
+            <a:extLst>
+              <a:ext uri="{FF2B5EF4-FFF2-40B4-BE49-F238E27FC236}">
+                <a16:creationId xmlns:a16="http://schemas.microsoft.com/office/drawing/2014/main" id="{088A4ACE-7DE0-4A95-AFE5-ADE37A3827EE}"/>
+              </a:ext>
+            </a:extLst>
+          </p:cNvPr>
+          <p:cNvPicPr>
+            <a:picLocks noChangeAspect="1"/>
+          </p:cNvPicPr>
+          <p:nvPr/>
+        </p:nvPicPr>
+        <p:blipFill>
+          <a:blip r:embed="rId4"/>
+          <a:stretch>
+            <a:fillRect/>
+          </a:stretch>
+        </p:blipFill>
+        <p:spPr>
+          <a:xfrm>
+            <a:off x="433754" y="2042350"/>
+            <a:ext cx="3917888" cy="3917888"/>
+          </a:xfrm>
+          <a:prstGeom prst="rect">
+            <a:avLst/>
+          </a:prstGeom>
+        </p:spPr>
+      </p:pic>
     </p:spTree>
+    <p:extLst>
+      <p:ext uri="{BB962C8B-B14F-4D97-AF65-F5344CB8AC3E}">
+        <p14:creationId xmlns:p14="http://schemas.microsoft.com/office/powerpoint/2010/main" val="1073952326"/>
+      </p:ext>
+    </p:extLst>
   </p:cSld>
   <p:clrMapOvr>
     <a:masterClrMapping/>
@@ -12345,7 +12466,7 @@
           </a:bodyPr>
           <a:lstStyle/>
           <a:p>
-            <a:pPr marL="0" lvl="0" indent="0" algn="l" rtl="0">
+            <a:pPr marL="0" lvl="0" indent="0" rtl="0">
               <a:lnSpc>
                 <a:spcPct val="90000"/>
               </a:lnSpc>
@@ -12363,12 +12484,12 @@
               <a:buNone/>
             </a:pPr>
             <a:r>
-              <a:rPr lang="en-US" b="1" dirty="0">
+              <a:rPr lang="es-MX" b="1" dirty="0">
                 <a:solidFill>
                   <a:schemeClr val="accent5"/>
                 </a:solidFill>
               </a:rPr>
-              <a:t>RESULTADOS</a:t>
+              <a:t>OBJETIVO</a:t>
             </a:r>
             <a:endParaRPr b="1" dirty="0">
               <a:solidFill>
@@ -12407,6 +12528,32 @@
           </a:bodyPr>
           <a:lstStyle/>
           <a:p>
+            <a:pPr marL="228600" indent="-50800">
+              <a:spcBef>
+                <a:spcPts val="0"/>
+              </a:spcBef>
+              <a:buSzPts val="2800"/>
+              <a:buNone/>
+            </a:pPr>
+            <a:r>
+              <a:rPr lang="es-CO" dirty="0">
+                <a:solidFill>
+                  <a:srgbClr val="000000"/>
+                </a:solidFill>
+                <a:effectLst/>
+                <a:latin typeface="Garamond" panose="02020404030301010803" pitchFamily="18" charset="0"/>
+                <a:ea typeface="Garamond" panose="02020404030301010803" pitchFamily="18" charset="0"/>
+                <a:cs typeface="Garamond" panose="02020404030301010803" pitchFamily="18" charset="0"/>
+              </a:rPr>
+              <a:t>Desarrollar una plataforma web que mida material particulado PM10 y PM 2.5 para el monitoreo de la calidad del aire en la Universidad Mariana con el fin de que la comunidad universitaria tenga consciencia sobre la calidad del aire que respira.</a:t>
+            </a:r>
+            <a:endParaRPr lang="es-CO" dirty="0">
+              <a:effectLst/>
+              <a:latin typeface="Calibri" panose="020F0502020204030204" pitchFamily="34" charset="0"/>
+              <a:ea typeface="Calibri" panose="020F0502020204030204" pitchFamily="34" charset="0"/>
+            </a:endParaRPr>
+          </a:p>
+          <a:p>
             <a:pPr marL="228600" lvl="0" indent="-50800" algn="l" rtl="0">
               <a:lnSpc>
                 <a:spcPct val="90000"/>
@@ -12423,7 +12570,7 @@
               <a:buSzPts val="2800"/>
               <a:buNone/>
             </a:pPr>
-            <a:endParaRPr/>
+            <a:endParaRPr dirty="0"/>
           </a:p>
         </p:txBody>
       </p:sp>
@@ -12494,7 +12641,7 @@
           </a:bodyPr>
           <a:lstStyle/>
           <a:p>
-            <a:pPr marL="0" lvl="0" indent="0" algn="l" rtl="0">
+            <a:pPr marL="0" lvl="0" indent="0" algn="r" rtl="0">
               <a:lnSpc>
                 <a:spcPct val="90000"/>
               </a:lnSpc>
@@ -12511,7 +12658,25 @@
               <a:buFont typeface="Calibri"/>
               <a:buNone/>
             </a:pPr>
-            <a:endParaRPr/>
+            <a:r>
+              <a:rPr lang="es-MX" dirty="0">
+                <a:solidFill>
+                  <a:schemeClr val="accent5">
+                    <a:lumMod val="60000"/>
+                    <a:lumOff val="40000"/>
+                  </a:schemeClr>
+                </a:solidFill>
+              </a:rPr>
+              <a:t>METODOLOGÍA </a:t>
+            </a:r>
+            <a:endParaRPr dirty="0">
+              <a:solidFill>
+                <a:schemeClr val="accent5">
+                  <a:lumMod val="60000"/>
+                  <a:lumOff val="40000"/>
+                </a:schemeClr>
+              </a:solidFill>
+            </a:endParaRPr>
           </a:p>
         </p:txBody>
       </p:sp>
@@ -12560,7 +12725,7 @@
               <a:buSzPts val="2800"/>
               <a:buNone/>
             </a:pPr>
-            <a:endParaRPr/>
+            <a:endParaRPr dirty="0"/>
           </a:p>
         </p:txBody>
       </p:sp>
@@ -12573,6 +12738,161 @@
 </file>
 
 <file path=ppt/slides/slide6.xml><?xml version="1.0" encoding="utf-8"?>
+<p:sld xmlns:a="http://schemas.openxmlformats.org/drawingml/2006/main" xmlns:r="http://schemas.openxmlformats.org/officeDocument/2006/relationships" xmlns:p="http://schemas.openxmlformats.org/presentationml/2006/main">
+  <p:cSld>
+    <p:bg>
+      <p:bgPr>
+        <a:blipFill>
+          <a:blip r:embed="rId3">
+            <a:alphaModFix/>
+          </a:blip>
+          <a:stretch>
+            <a:fillRect/>
+          </a:stretch>
+        </a:blipFill>
+        <a:effectLst/>
+      </p:bgPr>
+    </p:bg>
+    <p:spTree>
+      <p:nvGrpSpPr>
+        <p:cNvPr id="1" name="Shape 119"/>
+        <p:cNvGrpSpPr/>
+        <p:nvPr/>
+      </p:nvGrpSpPr>
+      <p:grpSpPr>
+        <a:xfrm>
+          <a:off x="0" y="0"/>
+          <a:ext cx="0" cy="0"/>
+          <a:chOff x="0" y="0"/>
+          <a:chExt cx="0" cy="0"/>
+        </a:xfrm>
+      </p:grpSpPr>
+      <p:sp>
+        <p:nvSpPr>
+          <p:cNvPr id="120" name="Google Shape;120;p7"/>
+          <p:cNvSpPr txBox="1">
+            <a:spLocks noGrp="1"/>
+          </p:cNvSpPr>
+          <p:nvPr>
+            <p:ph type="title"/>
+          </p:nvPr>
+        </p:nvSpPr>
+        <p:spPr>
+          <a:xfrm>
+            <a:off x="838200" y="365125"/>
+            <a:ext cx="10515600" cy="1325563"/>
+          </a:xfrm>
+          <a:prstGeom prst="rect">
+            <a:avLst/>
+          </a:prstGeom>
+          <a:noFill/>
+          <a:ln>
+            <a:noFill/>
+          </a:ln>
+        </p:spPr>
+        <p:txBody>
+          <a:bodyPr spcFirstLastPara="1" wrap="square" lIns="91425" tIns="45700" rIns="91425" bIns="45700" anchor="ctr" anchorCtr="0">
+            <a:normAutofit/>
+          </a:bodyPr>
+          <a:lstStyle/>
+          <a:p>
+            <a:pPr marL="0" lvl="0" indent="0" algn="r" rtl="0">
+              <a:lnSpc>
+                <a:spcPct val="90000"/>
+              </a:lnSpc>
+              <a:spcBef>
+                <a:spcPts val="0"/>
+              </a:spcBef>
+              <a:spcAft>
+                <a:spcPts val="0"/>
+              </a:spcAft>
+              <a:buClr>
+                <a:schemeClr val="dk1"/>
+              </a:buClr>
+              <a:buSzPts val="4400"/>
+              <a:buFont typeface="Calibri"/>
+              <a:buNone/>
+            </a:pPr>
+            <a:r>
+              <a:rPr lang="es-MX" dirty="0">
+                <a:solidFill>
+                  <a:schemeClr val="accent6">
+                    <a:lumMod val="60000"/>
+                    <a:lumOff val="40000"/>
+                  </a:schemeClr>
+                </a:solidFill>
+              </a:rPr>
+              <a:t>RESULTADOS</a:t>
+            </a:r>
+            <a:endParaRPr dirty="0">
+              <a:solidFill>
+                <a:schemeClr val="accent6">
+                  <a:lumMod val="60000"/>
+                  <a:lumOff val="40000"/>
+                </a:schemeClr>
+              </a:solidFill>
+            </a:endParaRPr>
+          </a:p>
+        </p:txBody>
+      </p:sp>
+      <p:sp>
+        <p:nvSpPr>
+          <p:cNvPr id="121" name="Google Shape;121;p7"/>
+          <p:cNvSpPr txBox="1">
+            <a:spLocks noGrp="1"/>
+          </p:cNvSpPr>
+          <p:nvPr>
+            <p:ph type="body" idx="1"/>
+          </p:nvPr>
+        </p:nvSpPr>
+        <p:spPr>
+          <a:xfrm>
+            <a:off x="838200" y="1825625"/>
+            <a:ext cx="10515600" cy="4351338"/>
+          </a:xfrm>
+          <a:prstGeom prst="rect">
+            <a:avLst/>
+          </a:prstGeom>
+          <a:noFill/>
+          <a:ln>
+            <a:noFill/>
+          </a:ln>
+        </p:spPr>
+        <p:txBody>
+          <a:bodyPr spcFirstLastPara="1" wrap="square" lIns="91425" tIns="45700" rIns="91425" bIns="45700" anchor="t" anchorCtr="0">
+            <a:normAutofit/>
+          </a:bodyPr>
+          <a:lstStyle/>
+          <a:p>
+            <a:pPr marL="228600" lvl="0" indent="-50800" algn="l" rtl="0">
+              <a:lnSpc>
+                <a:spcPct val="90000"/>
+              </a:lnSpc>
+              <a:spcBef>
+                <a:spcPts val="0"/>
+              </a:spcBef>
+              <a:spcAft>
+                <a:spcPts val="0"/>
+              </a:spcAft>
+              <a:buClr>
+                <a:schemeClr val="dk1"/>
+              </a:buClr>
+              <a:buSzPts val="2800"/>
+              <a:buNone/>
+            </a:pPr>
+            <a:endParaRPr dirty="0"/>
+          </a:p>
+        </p:txBody>
+      </p:sp>
+    </p:spTree>
+  </p:cSld>
+  <p:clrMapOvr>
+    <a:masterClrMapping/>
+  </p:clrMapOvr>
+</p:sld>
+</file>
+
+<file path=ppt/slides/slide7.xml><?xml version="1.0" encoding="utf-8"?>
 <p:sld xmlns:a="http://schemas.openxmlformats.org/drawingml/2006/main" xmlns:r="http://schemas.openxmlformats.org/officeDocument/2006/relationships" xmlns:p="http://schemas.openxmlformats.org/presentationml/2006/main">
   <p:cSld>
     <p:bg>
@@ -12648,150 +12968,17 @@
               <a:buFont typeface="Calibri"/>
               <a:buNone/>
             </a:pPr>
-            <a:endParaRPr/>
+            <a:r>
+              <a:rPr lang="es-MX" dirty="0"/>
+              <a:t>CONCLUSIÓN</a:t>
+            </a:r>
+            <a:endParaRPr dirty="0"/>
           </a:p>
         </p:txBody>
       </p:sp>
       <p:sp>
         <p:nvSpPr>
           <p:cNvPr id="115" name="Google Shape;115;p6"/>
-          <p:cNvSpPr txBox="1">
-            <a:spLocks noGrp="1"/>
-          </p:cNvSpPr>
-          <p:nvPr>
-            <p:ph type="body" idx="1"/>
-          </p:nvPr>
-        </p:nvSpPr>
-        <p:spPr>
-          <a:xfrm>
-            <a:off x="838200" y="1825625"/>
-            <a:ext cx="10515600" cy="4351338"/>
-          </a:xfrm>
-          <a:prstGeom prst="rect">
-            <a:avLst/>
-          </a:prstGeom>
-          <a:noFill/>
-          <a:ln>
-            <a:noFill/>
-          </a:ln>
-        </p:spPr>
-        <p:txBody>
-          <a:bodyPr spcFirstLastPara="1" wrap="square" lIns="91425" tIns="45700" rIns="91425" bIns="45700" anchor="t" anchorCtr="0">
-            <a:normAutofit/>
-          </a:bodyPr>
-          <a:lstStyle/>
-          <a:p>
-            <a:pPr marL="228600" lvl="0" indent="-50800" algn="l" rtl="0">
-              <a:lnSpc>
-                <a:spcPct val="90000"/>
-              </a:lnSpc>
-              <a:spcBef>
-                <a:spcPts val="0"/>
-              </a:spcBef>
-              <a:spcAft>
-                <a:spcPts val="0"/>
-              </a:spcAft>
-              <a:buClr>
-                <a:schemeClr val="dk1"/>
-              </a:buClr>
-              <a:buSzPts val="2800"/>
-              <a:buNone/>
-            </a:pPr>
-            <a:endParaRPr/>
-          </a:p>
-        </p:txBody>
-      </p:sp>
-    </p:spTree>
-  </p:cSld>
-  <p:clrMapOvr>
-    <a:masterClrMapping/>
-  </p:clrMapOvr>
-</p:sld>
-</file>
-
-<file path=ppt/slides/slide7.xml><?xml version="1.0" encoding="utf-8"?>
-<p:sld xmlns:a="http://schemas.openxmlformats.org/drawingml/2006/main" xmlns:r="http://schemas.openxmlformats.org/officeDocument/2006/relationships" xmlns:p="http://schemas.openxmlformats.org/presentationml/2006/main">
-  <p:cSld>
-    <p:bg>
-      <p:bgPr>
-        <a:blipFill>
-          <a:blip r:embed="rId3">
-            <a:alphaModFix/>
-          </a:blip>
-          <a:stretch>
-            <a:fillRect/>
-          </a:stretch>
-        </a:blipFill>
-        <a:effectLst/>
-      </p:bgPr>
-    </p:bg>
-    <p:spTree>
-      <p:nvGrpSpPr>
-        <p:cNvPr id="1" name="Shape 119"/>
-        <p:cNvGrpSpPr/>
-        <p:nvPr/>
-      </p:nvGrpSpPr>
-      <p:grpSpPr>
-        <a:xfrm>
-          <a:off x="0" y="0"/>
-          <a:ext cx="0" cy="0"/>
-          <a:chOff x="0" y="0"/>
-          <a:chExt cx="0" cy="0"/>
-        </a:xfrm>
-      </p:grpSpPr>
-      <p:sp>
-        <p:nvSpPr>
-          <p:cNvPr id="120" name="Google Shape;120;p7"/>
-          <p:cNvSpPr txBox="1">
-            <a:spLocks noGrp="1"/>
-          </p:cNvSpPr>
-          <p:nvPr>
-            <p:ph type="title"/>
-          </p:nvPr>
-        </p:nvSpPr>
-        <p:spPr>
-          <a:xfrm>
-            <a:off x="838200" y="365125"/>
-            <a:ext cx="10515600" cy="1325563"/>
-          </a:xfrm>
-          <a:prstGeom prst="rect">
-            <a:avLst/>
-          </a:prstGeom>
-          <a:noFill/>
-          <a:ln>
-            <a:noFill/>
-          </a:ln>
-        </p:spPr>
-        <p:txBody>
-          <a:bodyPr spcFirstLastPara="1" wrap="square" lIns="91425" tIns="45700" rIns="91425" bIns="45700" anchor="ctr" anchorCtr="0">
-            <a:normAutofit/>
-          </a:bodyPr>
-          <a:lstStyle/>
-          <a:p>
-            <a:pPr marL="0" lvl="0" indent="0" algn="l" rtl="0">
-              <a:lnSpc>
-                <a:spcPct val="90000"/>
-              </a:lnSpc>
-              <a:spcBef>
-                <a:spcPts val="0"/>
-              </a:spcBef>
-              <a:spcAft>
-                <a:spcPts val="0"/>
-              </a:spcAft>
-              <a:buClr>
-                <a:schemeClr val="dk1"/>
-              </a:buClr>
-              <a:buSzPts val="4400"/>
-              <a:buFont typeface="Calibri"/>
-              <a:buNone/>
-            </a:pPr>
-            <a:endParaRPr/>
-          </a:p>
-        </p:txBody>
-      </p:sp>
-      <p:sp>
-        <p:nvSpPr>
-          <p:cNvPr id="121" name="Google Shape;121;p7"/>
           <p:cNvSpPr txBox="1">
             <a:spLocks noGrp="1"/>
           </p:cNvSpPr>

</xml_diff>